<commit_message>
finalizando exemplos e slides
</commit_message>
<xml_diff>
--- a/slides/Vinicius_Infoeste_2019.pptx
+++ b/slides/Vinicius_Infoeste_2019.pptx
@@ -123,7 +123,7 @@
   </p:defaultTextStyle>
   <p:extLst>
     <p:ext uri="{EFAFB233-063F-42B5-8137-9DF3F51BA10A}">
-      <p15:sldGuideLst xmlns:p15="http://schemas.microsoft.com/office/powerpoint/2012/main"/>
+      <p15:sldGuideLst xmlns:p15="http://schemas.microsoft.com/office/powerpoint/2012/main" xmlns=""/>
     </p:ext>
   </p:extLst>
 </p:presentation>
@@ -260,7 +260,7 @@
           <a:p>
             <a:fld id="{626380B7-0FA9-4F78-A0A5-93DADF34BB19}" type="datetimeFigureOut">
               <a:rPr lang="pt-BR" smtClean="0"/>
-              <a:t>10/05/2019</a:t>
+              <a:t>12/05/2019</a:t>
             </a:fld>
             <a:endParaRPr lang="pt-BR"/>
           </a:p>
@@ -430,7 +430,7 @@
           <a:p>
             <a:fld id="{626380B7-0FA9-4F78-A0A5-93DADF34BB19}" type="datetimeFigureOut">
               <a:rPr lang="pt-BR" smtClean="0"/>
-              <a:t>10/05/2019</a:t>
+              <a:t>12/05/2019</a:t>
             </a:fld>
             <a:endParaRPr lang="pt-BR"/>
           </a:p>
@@ -610,7 +610,7 @@
           <a:p>
             <a:fld id="{626380B7-0FA9-4F78-A0A5-93DADF34BB19}" type="datetimeFigureOut">
               <a:rPr lang="pt-BR" smtClean="0"/>
-              <a:t>10/05/2019</a:t>
+              <a:t>12/05/2019</a:t>
             </a:fld>
             <a:endParaRPr lang="pt-BR"/>
           </a:p>
@@ -780,7 +780,7 @@
           <a:p>
             <a:fld id="{626380B7-0FA9-4F78-A0A5-93DADF34BB19}" type="datetimeFigureOut">
               <a:rPr lang="pt-BR" smtClean="0"/>
-              <a:t>10/05/2019</a:t>
+              <a:t>12/05/2019</a:t>
             </a:fld>
             <a:endParaRPr lang="pt-BR"/>
           </a:p>
@@ -1026,7 +1026,7 @@
           <a:p>
             <a:fld id="{626380B7-0FA9-4F78-A0A5-93DADF34BB19}" type="datetimeFigureOut">
               <a:rPr lang="pt-BR" smtClean="0"/>
-              <a:t>10/05/2019</a:t>
+              <a:t>12/05/2019</a:t>
             </a:fld>
             <a:endParaRPr lang="pt-BR"/>
           </a:p>
@@ -1258,7 +1258,7 @@
           <a:p>
             <a:fld id="{626380B7-0FA9-4F78-A0A5-93DADF34BB19}" type="datetimeFigureOut">
               <a:rPr lang="pt-BR" smtClean="0"/>
-              <a:t>10/05/2019</a:t>
+              <a:t>12/05/2019</a:t>
             </a:fld>
             <a:endParaRPr lang="pt-BR"/>
           </a:p>
@@ -1625,7 +1625,7 @@
           <a:p>
             <a:fld id="{626380B7-0FA9-4F78-A0A5-93DADF34BB19}" type="datetimeFigureOut">
               <a:rPr lang="pt-BR" smtClean="0"/>
-              <a:t>10/05/2019</a:t>
+              <a:t>12/05/2019</a:t>
             </a:fld>
             <a:endParaRPr lang="pt-BR"/>
           </a:p>
@@ -1743,7 +1743,7 @@
           <a:p>
             <a:fld id="{626380B7-0FA9-4F78-A0A5-93DADF34BB19}" type="datetimeFigureOut">
               <a:rPr lang="pt-BR" smtClean="0"/>
-              <a:t>10/05/2019</a:t>
+              <a:t>12/05/2019</a:t>
             </a:fld>
             <a:endParaRPr lang="pt-BR"/>
           </a:p>
@@ -1838,7 +1838,7 @@
           <a:p>
             <a:fld id="{626380B7-0FA9-4F78-A0A5-93DADF34BB19}" type="datetimeFigureOut">
               <a:rPr lang="pt-BR" smtClean="0"/>
-              <a:t>10/05/2019</a:t>
+              <a:t>12/05/2019</a:t>
             </a:fld>
             <a:endParaRPr lang="pt-BR"/>
           </a:p>
@@ -2115,7 +2115,7 @@
           <a:p>
             <a:fld id="{626380B7-0FA9-4F78-A0A5-93DADF34BB19}" type="datetimeFigureOut">
               <a:rPr lang="pt-BR" smtClean="0"/>
-              <a:t>10/05/2019</a:t>
+              <a:t>12/05/2019</a:t>
             </a:fld>
             <a:endParaRPr lang="pt-BR"/>
           </a:p>
@@ -2368,7 +2368,7 @@
           <a:p>
             <a:fld id="{626380B7-0FA9-4F78-A0A5-93DADF34BB19}" type="datetimeFigureOut">
               <a:rPr lang="pt-BR" smtClean="0"/>
-              <a:t>10/05/2019</a:t>
+              <a:t>12/05/2019</a:t>
             </a:fld>
             <a:endParaRPr lang="pt-BR"/>
           </a:p>
@@ -2581,7 +2581,7 @@
           <a:p>
             <a:fld id="{626380B7-0FA9-4F78-A0A5-93DADF34BB19}" type="datetimeFigureOut">
               <a:rPr lang="pt-BR" smtClean="0"/>
-              <a:t>10/05/2019</a:t>
+              <a:t>12/05/2019</a:t>
             </a:fld>
             <a:endParaRPr lang="pt-BR"/>
           </a:p>
@@ -3911,11 +3911,7 @@
           <a:p>
             <a:r>
               <a:rPr lang="pt-BR" dirty="0" smtClean="0"/>
-              <a:t>Criação de um layout com </a:t>
-            </a:r>
-            <a:r>
-              <a:rPr lang="pt-BR" dirty="0" smtClean="0"/>
-              <a:t>4 páginas;</a:t>
+              <a:t>Criação de um layout com 4 páginas;</a:t>
             </a:r>
             <a:endParaRPr lang="pt-BR" dirty="0"/>
           </a:p>
@@ -3932,7 +3928,6 @@
               <a:rPr lang="pt-BR" dirty="0" smtClean="0"/>
               <a:t>Sobre;</a:t>
             </a:r>
-            <a:endParaRPr lang="pt-BR" dirty="0" smtClean="0"/>
           </a:p>
           <a:p>
             <a:pPr lvl="1"/>
@@ -5069,7 +5064,9 @@
           <a:lstStyle/>
           <a:p>
             <a:r>
-              <a:rPr lang="pt-BR" dirty="0" smtClean="0"/>
+              <a:rPr lang="pt-BR" dirty="0" smtClean="0">
+                <a:hlinkClick r:id="rId2"/>
+              </a:rPr>
               <a:t>Link.</a:t>
             </a:r>
             <a:endParaRPr lang="pt-BR" dirty="0"/>
@@ -5254,7 +5251,7 @@
     </a:clrScheme>
     <a:fontScheme name="Escritório">
       <a:majorFont>
-        <a:latin typeface="Calibri Light" panose="020F0302020204030204"/>
+        <a:latin typeface="Calibri Light"/>
         <a:ea typeface=""/>
         <a:cs typeface=""/>
         <a:font script="Jpan" typeface="ＭＳ Ｐゴシック"/>
@@ -5289,7 +5286,7 @@
         <a:font script="Geor" typeface="Sylfaen"/>
       </a:majorFont>
       <a:minorFont>
-        <a:latin typeface="Calibri" panose="020F0502020204030204"/>
+        <a:latin typeface="Calibri"/>
         <a:ea typeface=""/>
         <a:cs typeface=""/>
         <a:font script="Jpan" typeface="ＭＳ Ｐゴシック"/>
@@ -5466,7 +5463,7 @@
   <a:extraClrSchemeLst/>
   <a:extLst>
     <a:ext uri="{05A4C25C-085E-4340-85A3-A5531E510DB2}">
-      <thm15:themeFamily xmlns:thm15="http://schemas.microsoft.com/office/thememl/2012/main" name="Office Theme" id="{62F939B6-93AF-4DB8-9C6B-D6C7DFDC589F}" vid="{4A3C46E8-61CC-4603-A589-7422A47A8E4A}"/>
+      <thm15:themeFamily xmlns:thm15="http://schemas.microsoft.com/office/thememl/2012/main" xmlns="" name="Office Theme" id="{62F939B6-93AF-4DB8-9C6B-D6C7DFDC589F}" vid="{4A3C46E8-61CC-4603-A589-7422A47A8E4A}"/>
     </a:ext>
   </a:extLst>
 </a:theme>

</xml_diff>